<commit_message>
NewPoll component on Fron-End
</commit_message>
<xml_diff>
--- a/docs/DEMOCRAPP.pptx
+++ b/docs/DEMOCRAPP.pptx
@@ -3046,35 +3046,35 @@
           <a:p>
             <a:r>
               <a:rPr lang="es-ES" altLang="en-US"/>
-              <a:t>The user can log in and log out</a:t>
+              <a:t>The user can log in and log out [x]</a:t>
             </a:r>
             <a:endParaRPr lang="es-ES" altLang="en-US"/>
           </a:p>
           <a:p>
             <a:r>
               <a:rPr lang="es-ES" altLang="en-US"/>
-              <a:t>The user can write new polls</a:t>
+              <a:t>The user can write new polls []</a:t>
             </a:r>
             <a:endParaRPr lang="es-ES" altLang="en-US"/>
           </a:p>
           <a:p>
             <a:r>
               <a:rPr lang="es-ES" altLang="en-US"/>
-              <a:t>Only him can change his profile</a:t>
+              <a:t>Only him can change or delete his profile [x]</a:t>
             </a:r>
             <a:endParaRPr lang="es-ES" altLang="en-US"/>
           </a:p>
           <a:p>
             <a:r>
               <a:rPr lang="es-ES" altLang="en-US"/>
-              <a:t>Only him can edit his polls content</a:t>
+              <a:t>Only him can edit his polls content []</a:t>
             </a:r>
             <a:endParaRPr lang="es-ES" altLang="en-US"/>
           </a:p>
           <a:p>
             <a:r>
               <a:rPr lang="es-ES" altLang="en-US"/>
-              <a:t>The user can vote any poll (this info will be stored inside the info of the poll)</a:t>
+              <a:t>The user can vote any poll (this info will be stored inside the info of the poll) []</a:t>
             </a:r>
             <a:endParaRPr lang="es-ES" altLang="en-US"/>
           </a:p>

</xml_diff>